<commit_message>
Actualización de diagrama de servicios en producción - se ha agregado una capa de encriptación -
</commit_message>
<xml_diff>
--- a/WebApiAutomotoras/documentacion/modelo APP Services/borrador_01.pptx
+++ b/WebApiAutomotoras/documentacion/modelo APP Services/borrador_01.pptx
@@ -5,12 +5,13 @@
     <p:sldMasterId id="2147483648" r:id="rId1"/>
   </p:sldMasterIdLst>
   <p:notesMasterIdLst>
-    <p:notesMasterId r:id="rId5"/>
+    <p:notesMasterId r:id="rId6"/>
   </p:notesMasterIdLst>
   <p:sldIdLst>
     <p:sldId id="256" r:id="rId2"/>
     <p:sldId id="257" r:id="rId3"/>
     <p:sldId id="258" r:id="rId4"/>
+    <p:sldId id="259" r:id="rId5"/>
   </p:sldIdLst>
   <p:sldSz cx="13004800" cy="9753600"/>
   <p:notesSz cx="6858000" cy="9144000"/>
@@ -4246,7 +4247,7 @@
           </a:ln>
           <a:extLst>
             <a:ext uri="{C572A759-6A51-4108-AA02-DFA0A04FC94B}">
-              <ma14:wrappingTextBoxFlag xmlns="" xmlns:ma14="http://schemas.microsoft.com/office/mac/drawingml/2011/main" xmlns:mv="urn:schemas-microsoft-com:mac:vml" xmlns:mc="http://schemas.openxmlformats.org/markup-compatibility/2006" val="1"/>
+              <ma14:wrappingTextBoxFlag xmlns:mc="http://schemas.openxmlformats.org/markup-compatibility/2006" xmlns:mv="urn:schemas-microsoft-com:mac:vml" xmlns:ma14="http://schemas.microsoft.com/office/mac/drawingml/2011/main" xmlns="" val="1"/>
             </a:ext>
           </a:extLst>
         </p:spPr>
@@ -4335,7 +4336,7 @@
           </a:ln>
           <a:extLst>
             <a:ext uri="{C572A759-6A51-4108-AA02-DFA0A04FC94B}">
-              <ma14:wrappingTextBoxFlag xmlns="" xmlns:ma14="http://schemas.microsoft.com/office/mac/drawingml/2011/main" xmlns:mv="urn:schemas-microsoft-com:mac:vml" xmlns:mc="http://schemas.openxmlformats.org/markup-compatibility/2006" val="1"/>
+              <ma14:wrappingTextBoxFlag xmlns:mc="http://schemas.openxmlformats.org/markup-compatibility/2006" xmlns:mv="urn:schemas-microsoft-com:mac:vml" xmlns:ma14="http://schemas.microsoft.com/office/mac/drawingml/2011/main" xmlns="" val="1"/>
             </a:ext>
           </a:extLst>
         </p:spPr>
@@ -5400,7 +5401,7 @@
           </a:effectLst>
           <a:extLst>
             <a:ext uri="{C572A759-6A51-4108-AA02-DFA0A04FC94B}">
-              <ma14:wrappingTextBoxFlag xmlns="" xmlns:ma14="http://schemas.microsoft.com/office/mac/drawingml/2011/main" xmlns:mv="urn:schemas-microsoft-com:mac:vml" xmlns:mc="http://schemas.openxmlformats.org/markup-compatibility/2006" val="1"/>
+              <ma14:wrappingTextBoxFlag xmlns:mc="http://schemas.openxmlformats.org/markup-compatibility/2006" xmlns:mv="urn:schemas-microsoft-com:mac:vml" xmlns:ma14="http://schemas.microsoft.com/office/mac/drawingml/2011/main" xmlns="" val="1"/>
             </a:ext>
           </a:extLst>
         </p:spPr>
@@ -5457,7 +5458,7 @@
           </a:effectLst>
           <a:extLst>
             <a:ext uri="{C572A759-6A51-4108-AA02-DFA0A04FC94B}">
-              <ma14:wrappingTextBoxFlag xmlns="" xmlns:ma14="http://schemas.microsoft.com/office/mac/drawingml/2011/main" xmlns:mv="urn:schemas-microsoft-com:mac:vml" xmlns:mc="http://schemas.openxmlformats.org/markup-compatibility/2006" val="1"/>
+              <ma14:wrappingTextBoxFlag xmlns:mc="http://schemas.openxmlformats.org/markup-compatibility/2006" xmlns:mv="urn:schemas-microsoft-com:mac:vml" xmlns:ma14="http://schemas.microsoft.com/office/mac/drawingml/2011/main" xmlns="" val="1"/>
             </a:ext>
           </a:extLst>
         </p:spPr>
@@ -5522,7 +5523,7 @@
           </a:ln>
           <a:extLst>
             <a:ext uri="{C572A759-6A51-4108-AA02-DFA0A04FC94B}">
-              <ma14:wrappingTextBoxFlag xmlns="" xmlns:ma14="http://schemas.microsoft.com/office/mac/drawingml/2011/main" xmlns:mv="urn:schemas-microsoft-com:mac:vml" xmlns:mc="http://schemas.openxmlformats.org/markup-compatibility/2006" val="1"/>
+              <ma14:wrappingTextBoxFlag xmlns:mc="http://schemas.openxmlformats.org/markup-compatibility/2006" xmlns:mv="urn:schemas-microsoft-com:mac:vml" xmlns:ma14="http://schemas.microsoft.com/office/mac/drawingml/2011/main" xmlns="" val="1"/>
             </a:ext>
           </a:extLst>
         </p:spPr>
@@ -5594,7 +5595,7 @@
           </a:effectLst>
           <a:extLst>
             <a:ext uri="{C572A759-6A51-4108-AA02-DFA0A04FC94B}">
-              <ma14:wrappingTextBoxFlag xmlns="" xmlns:ma14="http://schemas.microsoft.com/office/mac/drawingml/2011/main" xmlns:mv="urn:schemas-microsoft-com:mac:vml" xmlns:mc="http://schemas.openxmlformats.org/markup-compatibility/2006" val="1"/>
+              <ma14:wrappingTextBoxFlag xmlns:mc="http://schemas.openxmlformats.org/markup-compatibility/2006" xmlns:mv="urn:schemas-microsoft-com:mac:vml" xmlns:ma14="http://schemas.microsoft.com/office/mac/drawingml/2011/main" xmlns="" val="1"/>
             </a:ext>
           </a:extLst>
         </p:spPr>
@@ -5651,7 +5652,7 @@
           </a:effectLst>
           <a:extLst>
             <a:ext uri="{C572A759-6A51-4108-AA02-DFA0A04FC94B}">
-              <ma14:wrappingTextBoxFlag xmlns="" xmlns:ma14="http://schemas.microsoft.com/office/mac/drawingml/2011/main" xmlns:mv="urn:schemas-microsoft-com:mac:vml" xmlns:mc="http://schemas.openxmlformats.org/markup-compatibility/2006" val="1"/>
+              <ma14:wrappingTextBoxFlag xmlns:mc="http://schemas.openxmlformats.org/markup-compatibility/2006" xmlns:mv="urn:schemas-microsoft-com:mac:vml" xmlns:ma14="http://schemas.microsoft.com/office/mac/drawingml/2011/main" xmlns="" val="1"/>
             </a:ext>
           </a:extLst>
         </p:spPr>
@@ -5723,7 +5724,7 @@
           </a:effectLst>
           <a:extLst>
             <a:ext uri="{C572A759-6A51-4108-AA02-DFA0A04FC94B}">
-              <ma14:wrappingTextBoxFlag xmlns="" xmlns:ma14="http://schemas.microsoft.com/office/mac/drawingml/2011/main" xmlns:mv="urn:schemas-microsoft-com:mac:vml" xmlns:mc="http://schemas.openxmlformats.org/markup-compatibility/2006" val="1"/>
+              <ma14:wrappingTextBoxFlag xmlns:mc="http://schemas.openxmlformats.org/markup-compatibility/2006" xmlns:mv="urn:schemas-microsoft-com:mac:vml" xmlns:ma14="http://schemas.microsoft.com/office/mac/drawingml/2011/main" xmlns="" val="1"/>
             </a:ext>
           </a:extLst>
         </p:spPr>
@@ -5824,7 +5825,7 @@
           </a:ln>
           <a:extLst>
             <a:ext uri="{C572A759-6A51-4108-AA02-DFA0A04FC94B}">
-              <ma14:wrappingTextBoxFlag xmlns="" xmlns:ma14="http://schemas.microsoft.com/office/mac/drawingml/2011/main" xmlns:mv="urn:schemas-microsoft-com:mac:vml" xmlns:mc="http://schemas.openxmlformats.org/markup-compatibility/2006" val="1"/>
+              <ma14:wrappingTextBoxFlag xmlns:mc="http://schemas.openxmlformats.org/markup-compatibility/2006" xmlns:mv="urn:schemas-microsoft-com:mac:vml" xmlns:ma14="http://schemas.microsoft.com/office/mac/drawingml/2011/main" xmlns="" val="1"/>
             </a:ext>
           </a:extLst>
         </p:spPr>
@@ -5915,7 +5916,7 @@
           </a:ln>
           <a:extLst>
             <a:ext uri="{C572A759-6A51-4108-AA02-DFA0A04FC94B}">
-              <ma14:wrappingTextBoxFlag xmlns="" xmlns:ma14="http://schemas.microsoft.com/office/mac/drawingml/2011/main" xmlns:mv="urn:schemas-microsoft-com:mac:vml" xmlns:mc="http://schemas.openxmlformats.org/markup-compatibility/2006" val="1"/>
+              <ma14:wrappingTextBoxFlag xmlns:mc="http://schemas.openxmlformats.org/markup-compatibility/2006" xmlns:mv="urn:schemas-microsoft-com:mac:vml" xmlns:ma14="http://schemas.microsoft.com/office/mac/drawingml/2011/main" xmlns="" val="1"/>
             </a:ext>
           </a:extLst>
         </p:spPr>
@@ -6001,7 +6002,7 @@
           </a:ln>
           <a:extLst>
             <a:ext uri="{C572A759-6A51-4108-AA02-DFA0A04FC94B}">
-              <ma14:wrappingTextBoxFlag xmlns="" xmlns:ma14="http://schemas.microsoft.com/office/mac/drawingml/2011/main" xmlns:mv="urn:schemas-microsoft-com:mac:vml" xmlns:mc="http://schemas.openxmlformats.org/markup-compatibility/2006" val="1"/>
+              <ma14:wrappingTextBoxFlag xmlns:mc="http://schemas.openxmlformats.org/markup-compatibility/2006" xmlns:mv="urn:schemas-microsoft-com:mac:vml" xmlns:ma14="http://schemas.microsoft.com/office/mac/drawingml/2011/main" xmlns="" val="1"/>
             </a:ext>
           </a:extLst>
         </p:spPr>
@@ -6089,7 +6090,7 @@
           </a:ln>
           <a:extLst>
             <a:ext uri="{C572A759-6A51-4108-AA02-DFA0A04FC94B}">
-              <ma14:wrappingTextBoxFlag xmlns="" xmlns:ma14="http://schemas.microsoft.com/office/mac/drawingml/2011/main" xmlns:mv="urn:schemas-microsoft-com:mac:vml" xmlns:mc="http://schemas.openxmlformats.org/markup-compatibility/2006" val="1"/>
+              <ma14:wrappingTextBoxFlag xmlns:mc="http://schemas.openxmlformats.org/markup-compatibility/2006" xmlns:mv="urn:schemas-microsoft-com:mac:vml" xmlns:ma14="http://schemas.microsoft.com/office/mac/drawingml/2011/main" xmlns="" val="1"/>
             </a:ext>
           </a:extLst>
         </p:spPr>
@@ -6148,7 +6149,7 @@
           </a:effectLst>
           <a:extLst>
             <a:ext uri="{C572A759-6A51-4108-AA02-DFA0A04FC94B}">
-              <ma14:wrappingTextBoxFlag xmlns="" xmlns:ma14="http://schemas.microsoft.com/office/mac/drawingml/2011/main" xmlns:mv="urn:schemas-microsoft-com:mac:vml" xmlns:mc="http://schemas.openxmlformats.org/markup-compatibility/2006" val="1"/>
+              <ma14:wrappingTextBoxFlag xmlns:mc="http://schemas.openxmlformats.org/markup-compatibility/2006" xmlns:mv="urn:schemas-microsoft-com:mac:vml" xmlns:ma14="http://schemas.microsoft.com/office/mac/drawingml/2011/main" xmlns="" val="1"/>
             </a:ext>
           </a:extLst>
         </p:spPr>
@@ -6249,7 +6250,7 @@
           </a:ln>
           <a:extLst>
             <a:ext uri="{C572A759-6A51-4108-AA02-DFA0A04FC94B}">
-              <ma14:wrappingTextBoxFlag xmlns="" xmlns:ma14="http://schemas.microsoft.com/office/mac/drawingml/2011/main" xmlns:mv="urn:schemas-microsoft-com:mac:vml" xmlns:mc="http://schemas.openxmlformats.org/markup-compatibility/2006" val="1"/>
+              <ma14:wrappingTextBoxFlag xmlns:mc="http://schemas.openxmlformats.org/markup-compatibility/2006" xmlns:mv="urn:schemas-microsoft-com:mac:vml" xmlns:ma14="http://schemas.microsoft.com/office/mac/drawingml/2011/main" xmlns="" val="1"/>
             </a:ext>
           </a:extLst>
         </p:spPr>
@@ -6328,12 +6329,38 @@
           <a:lstStyle/>
           <a:p>
             <a:r>
-              <a:t>Modelo Servicio </a:t>
-            </a:r>
-            <a:r>
-              <a:rPr sz="2400"/>
-              <a:t>(Servicio)</a:t>
-            </a:r>
+              <a:rPr dirty="0" err="1"/>
+              <a:t>Modelo</a:t>
+            </a:r>
+            <a:r>
+              <a:rPr dirty="0"/>
+              <a:t> </a:t>
+            </a:r>
+            <a:r>
+              <a:rPr dirty="0" err="1"/>
+              <a:t>Servicio</a:t>
+            </a:r>
+            <a:r>
+              <a:rPr dirty="0"/>
+              <a:t> </a:t>
+            </a:r>
+            <a:r>
+              <a:rPr sz="2400" dirty="0"/>
+              <a:t>(</a:t>
+            </a:r>
+            <a:r>
+              <a:rPr sz="2400" dirty="0" err="1" smtClean="0"/>
+              <a:t>Servicio</a:t>
+            </a:r>
+            <a:r>
+              <a:rPr lang="es-ES" sz="2400" dirty="0" smtClean="0"/>
+              <a:t> Desarrollo</a:t>
+            </a:r>
+            <a:r>
+              <a:rPr sz="2400" dirty="0" smtClean="0"/>
+              <a:t>)</a:t>
+            </a:r>
+            <a:endParaRPr sz="2400" dirty="0"/>
           </a:p>
         </p:txBody>
       </p:sp>
@@ -6368,7 +6395,7 @@
           </a:effectLst>
           <a:extLst>
             <a:ext uri="{C572A759-6A51-4108-AA02-DFA0A04FC94B}">
-              <ma14:wrappingTextBoxFlag xmlns="" xmlns:ma14="http://schemas.microsoft.com/office/mac/drawingml/2011/main" xmlns:mv="urn:schemas-microsoft-com:mac:vml" xmlns:mc="http://schemas.openxmlformats.org/markup-compatibility/2006" val="1"/>
+              <ma14:wrappingTextBoxFlag xmlns:mc="http://schemas.openxmlformats.org/markup-compatibility/2006" xmlns:mv="urn:schemas-microsoft-com:mac:vml" xmlns:ma14="http://schemas.microsoft.com/office/mac/drawingml/2011/main" xmlns="" val="1"/>
             </a:ext>
           </a:extLst>
         </p:spPr>
@@ -6440,7 +6467,7 @@
           </a:effectLst>
           <a:extLst>
             <a:ext uri="{C572A759-6A51-4108-AA02-DFA0A04FC94B}">
-              <ma14:wrappingTextBoxFlag xmlns="" xmlns:ma14="http://schemas.microsoft.com/office/mac/drawingml/2011/main" xmlns:mv="urn:schemas-microsoft-com:mac:vml" xmlns:mc="http://schemas.openxmlformats.org/markup-compatibility/2006" val="1"/>
+              <ma14:wrappingTextBoxFlag xmlns:mc="http://schemas.openxmlformats.org/markup-compatibility/2006" xmlns:mv="urn:schemas-microsoft-com:mac:vml" xmlns:ma14="http://schemas.microsoft.com/office/mac/drawingml/2011/main" xmlns="" val="1"/>
             </a:ext>
           </a:extLst>
         </p:spPr>
@@ -6512,7 +6539,7 @@
           </a:effectLst>
           <a:extLst>
             <a:ext uri="{C572A759-6A51-4108-AA02-DFA0A04FC94B}">
-              <ma14:wrappingTextBoxFlag xmlns="" xmlns:ma14="http://schemas.microsoft.com/office/mac/drawingml/2011/main" xmlns:mv="urn:schemas-microsoft-com:mac:vml" xmlns:mc="http://schemas.openxmlformats.org/markup-compatibility/2006" val="1"/>
+              <ma14:wrappingTextBoxFlag xmlns:mc="http://schemas.openxmlformats.org/markup-compatibility/2006" xmlns:mv="urn:schemas-microsoft-com:mac:vml" xmlns:ma14="http://schemas.microsoft.com/office/mac/drawingml/2011/main" xmlns="" val="1"/>
             </a:ext>
           </a:extLst>
         </p:spPr>
@@ -6586,7 +6613,7 @@
           </a:effectLst>
           <a:extLst>
             <a:ext uri="{C572A759-6A51-4108-AA02-DFA0A04FC94B}">
-              <ma14:wrappingTextBoxFlag xmlns="" xmlns:ma14="http://schemas.microsoft.com/office/mac/drawingml/2011/main" xmlns:mv="urn:schemas-microsoft-com:mac:vml" xmlns:mc="http://schemas.openxmlformats.org/markup-compatibility/2006" val="1"/>
+              <ma14:wrappingTextBoxFlag xmlns:mc="http://schemas.openxmlformats.org/markup-compatibility/2006" xmlns:mv="urn:schemas-microsoft-com:mac:vml" xmlns:ma14="http://schemas.microsoft.com/office/mac/drawingml/2011/main" xmlns="" val="1"/>
             </a:ext>
           </a:extLst>
         </p:spPr>
@@ -6660,7 +6687,7 @@
           </a:effectLst>
           <a:extLst>
             <a:ext uri="{C572A759-6A51-4108-AA02-DFA0A04FC94B}">
-              <ma14:wrappingTextBoxFlag xmlns="" xmlns:ma14="http://schemas.microsoft.com/office/mac/drawingml/2011/main" xmlns:mv="urn:schemas-microsoft-com:mac:vml" xmlns:mc="http://schemas.openxmlformats.org/markup-compatibility/2006" val="1"/>
+              <ma14:wrappingTextBoxFlag xmlns:mc="http://schemas.openxmlformats.org/markup-compatibility/2006" xmlns:mv="urn:schemas-microsoft-com:mac:vml" xmlns:ma14="http://schemas.microsoft.com/office/mac/drawingml/2011/main" xmlns="" val="1"/>
             </a:ext>
           </a:extLst>
         </p:spPr>
@@ -6732,7 +6759,7 @@
           </a:effectLst>
           <a:extLst>
             <a:ext uri="{C572A759-6A51-4108-AA02-DFA0A04FC94B}">
-              <ma14:wrappingTextBoxFlag xmlns="" xmlns:ma14="http://schemas.microsoft.com/office/mac/drawingml/2011/main" xmlns:mv="urn:schemas-microsoft-com:mac:vml" xmlns:mc="http://schemas.openxmlformats.org/markup-compatibility/2006" val="1"/>
+              <ma14:wrappingTextBoxFlag xmlns:mc="http://schemas.openxmlformats.org/markup-compatibility/2006" xmlns:mv="urn:schemas-microsoft-com:mac:vml" xmlns:ma14="http://schemas.microsoft.com/office/mac/drawingml/2011/main" xmlns="" val="1"/>
             </a:ext>
           </a:extLst>
         </p:spPr>
@@ -6835,7 +6862,7 @@
           </a:effectLst>
           <a:extLst>
             <a:ext uri="{C572A759-6A51-4108-AA02-DFA0A04FC94B}">
-              <ma14:wrappingTextBoxFlag xmlns="" xmlns:ma14="http://schemas.microsoft.com/office/mac/drawingml/2011/main" xmlns:mv="urn:schemas-microsoft-com:mac:vml" xmlns:mc="http://schemas.openxmlformats.org/markup-compatibility/2006" val="1"/>
+              <ma14:wrappingTextBoxFlag xmlns:mc="http://schemas.openxmlformats.org/markup-compatibility/2006" xmlns:mv="urn:schemas-microsoft-com:mac:vml" xmlns:ma14="http://schemas.microsoft.com/office/mac/drawingml/2011/main" xmlns="" val="1"/>
             </a:ext>
           </a:extLst>
         </p:spPr>
@@ -7108,7 +7135,7 @@
           </a:effectLst>
           <a:extLst>
             <a:ext uri="{C572A759-6A51-4108-AA02-DFA0A04FC94B}">
-              <ma14:wrappingTextBoxFlag xmlns="" xmlns:ma14="http://schemas.microsoft.com/office/mac/drawingml/2011/main" xmlns:mv="urn:schemas-microsoft-com:mac:vml" xmlns:mc="http://schemas.openxmlformats.org/markup-compatibility/2006" val="1"/>
+              <ma14:wrappingTextBoxFlag xmlns:mc="http://schemas.openxmlformats.org/markup-compatibility/2006" xmlns:mv="urn:schemas-microsoft-com:mac:vml" xmlns:ma14="http://schemas.microsoft.com/office/mac/drawingml/2011/main" xmlns="" val="1"/>
             </a:ext>
           </a:extLst>
         </p:spPr>
@@ -7191,6 +7218,1097 @@
         </p:txBody>
       </p:sp>
     </p:spTree>
+  </p:cSld>
+  <p:clrMapOvr>
+    <a:masterClrMapping/>
+  </p:clrMapOvr>
+  <p:transition spd="med"/>
+  <p:timing>
+    <p:tnLst>
+      <p:par>
+        <p:cTn id="1" dur="indefinite" restart="never" nodeType="tmRoot"/>
+      </p:par>
+    </p:tnLst>
+  </p:timing>
+</p:sld>
+</file>
+
+<file path=ppt/slides/slide4.xml><?xml version="1.0" encoding="utf-8"?>
+<p:sld xmlns:a="http://schemas.openxmlformats.org/drawingml/2006/main" xmlns:r="http://schemas.openxmlformats.org/officeDocument/2006/relationships" xmlns:p="http://schemas.openxmlformats.org/presentationml/2006/main">
+  <p:cSld>
+    <p:spTree>
+      <p:nvGrpSpPr>
+        <p:cNvPr id="1" name=""/>
+        <p:cNvGrpSpPr/>
+        <p:nvPr/>
+      </p:nvGrpSpPr>
+      <p:grpSpPr>
+        <a:xfrm>
+          <a:off x="0" y="0"/>
+          <a:ext cx="0" cy="0"/>
+          <a:chOff x="0" y="0"/>
+          <a:chExt cx="0" cy="0"/>
+        </a:xfrm>
+      </p:grpSpPr>
+      <p:sp>
+        <p:nvSpPr>
+          <p:cNvPr id="186" name="Modelo Servicio (Servicio)"/>
+          <p:cNvSpPr>
+            <a:spLocks noGrp="1"/>
+          </p:cNvSpPr>
+          <p:nvPr>
+            <p:ph type="title"/>
+          </p:nvPr>
+        </p:nvSpPr>
+        <p:spPr>
+          <a:xfrm>
+            <a:off x="1041400" y="548226"/>
+            <a:ext cx="10922000" cy="1376246"/>
+          </a:xfrm>
+          <a:prstGeom prst="rect">
+            <a:avLst/>
+          </a:prstGeom>
+        </p:spPr>
+        <p:txBody>
+          <a:bodyPr/>
+          <a:lstStyle/>
+          <a:p>
+            <a:r>
+              <a:rPr dirty="0" err="1"/>
+              <a:t>Modelo</a:t>
+            </a:r>
+            <a:r>
+              <a:rPr dirty="0"/>
+              <a:t> </a:t>
+            </a:r>
+            <a:r>
+              <a:rPr dirty="0" err="1"/>
+              <a:t>Servicio</a:t>
+            </a:r>
+            <a:r>
+              <a:rPr dirty="0"/>
+              <a:t> </a:t>
+            </a:r>
+            <a:r>
+              <a:rPr sz="2400" dirty="0"/>
+              <a:t>(</a:t>
+            </a:r>
+            <a:r>
+              <a:rPr sz="2400" dirty="0" err="1" smtClean="0"/>
+              <a:t>Servicio</a:t>
+            </a:r>
+            <a:r>
+              <a:rPr lang="es-ES" sz="2400" dirty="0" smtClean="0"/>
+              <a:t> producción</a:t>
+            </a:r>
+            <a:r>
+              <a:rPr sz="2400" dirty="0" smtClean="0"/>
+              <a:t>)</a:t>
+            </a:r>
+            <a:endParaRPr sz="2400" dirty="0"/>
+          </a:p>
+        </p:txBody>
+      </p:sp>
+      <p:sp>
+        <p:nvSpPr>
+          <p:cNvPr id="187" name="Servicio Publicación…"/>
+          <p:cNvSpPr/>
+          <p:nvPr/>
+        </p:nvSpPr>
+        <p:spPr>
+          <a:xfrm>
+            <a:off x="3257834" y="2710388"/>
+            <a:ext cx="2164446" cy="5899286"/>
+          </a:xfrm>
+          <a:prstGeom prst="roundRect">
+            <a:avLst>
+              <a:gd name="adj" fmla="val 10356"/>
+            </a:avLst>
+          </a:prstGeom>
+          <a:solidFill>
+            <a:schemeClr val="accent2">
+              <a:lumMod val="75000"/>
+            </a:schemeClr>
+          </a:solidFill>
+          <a:ln w="12700">
+            <a:miter lim="400000"/>
+          </a:ln>
+          <a:effectLst>
+            <a:outerShdw blurRad="38100" dist="25400" dir="5400000" rotWithShape="0">
+              <a:srgbClr val="000000">
+                <a:alpha val="50000"/>
+              </a:srgbClr>
+            </a:outerShdw>
+          </a:effectLst>
+          <a:extLst>
+            <a:ext uri="{C572A759-6A51-4108-AA02-DFA0A04FC94B}">
+              <ma14:wrappingTextBoxFlag xmlns:mc="http://schemas.openxmlformats.org/markup-compatibility/2006" xmlns:mv="urn:schemas-microsoft-com:mac:vml" xmlns:ma14="http://schemas.microsoft.com/office/mac/drawingml/2011/main" xmlns="" val="1"/>
+            </a:ext>
+          </a:extLst>
+        </p:spPr>
+        <p:txBody>
+          <a:bodyPr lIns="50800" tIns="50800" rIns="50800" bIns="50800" anchor="ctr"/>
+          <a:lstStyle/>
+          <a:p>
+            <a:pPr>
+              <a:defRPr sz="2400">
+                <a:solidFill>
+                  <a:srgbClr val="FFFFFF"/>
+                </a:solidFill>
+                <a:latin typeface="Helvetica Light"/>
+                <a:ea typeface="Helvetica Light"/>
+                <a:cs typeface="Helvetica Light"/>
+                <a:sym typeface="Helvetica Light"/>
+              </a:defRPr>
+            </a:pPr>
+            <a:r>
+              <a:rPr lang="es-ES" dirty="0" smtClean="0"/>
+              <a:t>Criptograma x-</a:t>
+            </a:r>
+            <a:r>
+              <a:rPr lang="es-ES" dirty="0" err="1" smtClean="0"/>
+              <a:t>key</a:t>
+            </a:r>
+            <a:r>
+              <a:rPr lang="es-ES" dirty="0" smtClean="0"/>
+              <a:t> </a:t>
+            </a:r>
+            <a:br>
+              <a:rPr lang="es-ES" dirty="0" smtClean="0"/>
+            </a:br>
+            <a:r>
+              <a:rPr lang="es-ES" sz="1200" dirty="0" smtClean="0"/>
+              <a:t>(</a:t>
+            </a:r>
+            <a:r>
+              <a:rPr sz="1200" dirty="0" smtClean="0"/>
+              <a:t>ASP.NET</a:t>
+            </a:r>
+            <a:r>
+              <a:rPr sz="1200" dirty="0"/>
+              <a:t>)</a:t>
+            </a:r>
+          </a:p>
+        </p:txBody>
+      </p:sp>
+      <p:sp>
+        <p:nvSpPr>
+          <p:cNvPr id="188" name="UpLoad…"/>
+          <p:cNvSpPr/>
+          <p:nvPr/>
+        </p:nvSpPr>
+        <p:spPr>
+          <a:xfrm>
+            <a:off x="6235779" y="2932584"/>
+            <a:ext cx="2415773" cy="1067443"/>
+          </a:xfrm>
+          <a:prstGeom prst="roundRect">
+            <a:avLst>
+              <a:gd name="adj" fmla="val 25374"/>
+            </a:avLst>
+          </a:prstGeom>
+          <a:blipFill>
+            <a:blip r:embed="rId2"/>
+          </a:blipFill>
+          <a:ln w="12700">
+            <a:miter lim="400000"/>
+          </a:ln>
+          <a:effectLst>
+            <a:outerShdw blurRad="38100" dist="25400" dir="5400000" rotWithShape="0">
+              <a:srgbClr val="000000">
+                <a:alpha val="50000"/>
+              </a:srgbClr>
+            </a:outerShdw>
+          </a:effectLst>
+          <a:extLst>
+            <a:ext uri="{C572A759-6A51-4108-AA02-DFA0A04FC94B}">
+              <ma14:wrappingTextBoxFlag xmlns:mc="http://schemas.openxmlformats.org/markup-compatibility/2006" xmlns:mv="urn:schemas-microsoft-com:mac:vml" xmlns:ma14="http://schemas.microsoft.com/office/mac/drawingml/2011/main" xmlns="" val="1"/>
+            </a:ext>
+          </a:extLst>
+        </p:spPr>
+        <p:txBody>
+          <a:bodyPr lIns="50800" tIns="50800" rIns="50800" bIns="50800" anchor="ctr"/>
+          <a:lstStyle/>
+          <a:p>
+            <a:pPr>
+              <a:defRPr sz="2400">
+                <a:solidFill>
+                  <a:srgbClr val="FFFFFF"/>
+                </a:solidFill>
+                <a:latin typeface="Helvetica Light"/>
+                <a:ea typeface="Helvetica Light"/>
+                <a:cs typeface="Helvetica Light"/>
+                <a:sym typeface="Helvetica Light"/>
+              </a:defRPr>
+            </a:pPr>
+            <a:r>
+              <a:rPr dirty="0" err="1"/>
+              <a:t>UpLoad</a:t>
+            </a:r>
+            <a:r>
+              <a:rPr dirty="0"/>
+              <a:t> </a:t>
+            </a:r>
+          </a:p>
+          <a:p>
+            <a:pPr>
+              <a:defRPr sz="1600">
+                <a:solidFill>
+                  <a:srgbClr val="FFFFFF"/>
+                </a:solidFill>
+                <a:latin typeface="Helvetica Light"/>
+                <a:ea typeface="Helvetica Light"/>
+                <a:cs typeface="Helvetica Light"/>
+                <a:sym typeface="Helvetica Light"/>
+              </a:defRPr>
+            </a:pPr>
+            <a:r>
+              <a:rPr dirty="0"/>
+              <a:t>(XML File)</a:t>
+            </a:r>
+          </a:p>
+        </p:txBody>
+      </p:sp>
+      <p:sp>
+        <p:nvSpPr>
+          <p:cNvPr id="189" name="Autenticación…"/>
+          <p:cNvSpPr/>
+          <p:nvPr/>
+        </p:nvSpPr>
+        <p:spPr>
+          <a:xfrm>
+            <a:off x="6255782" y="4394575"/>
+            <a:ext cx="2415773" cy="1067442"/>
+          </a:xfrm>
+          <a:prstGeom prst="roundRect">
+            <a:avLst>
+              <a:gd name="adj" fmla="val 25374"/>
+            </a:avLst>
+          </a:prstGeom>
+          <a:blipFill>
+            <a:blip r:embed="rId2"/>
+          </a:blipFill>
+          <a:ln w="12700">
+            <a:miter lim="400000"/>
+          </a:ln>
+          <a:effectLst>
+            <a:outerShdw blurRad="38100" dist="25400" dir="5400000" rotWithShape="0">
+              <a:srgbClr val="000000">
+                <a:alpha val="50000"/>
+              </a:srgbClr>
+            </a:outerShdw>
+          </a:effectLst>
+          <a:extLst>
+            <a:ext uri="{C572A759-6A51-4108-AA02-DFA0A04FC94B}">
+              <ma14:wrappingTextBoxFlag xmlns:mc="http://schemas.openxmlformats.org/markup-compatibility/2006" xmlns:mv="urn:schemas-microsoft-com:mac:vml" xmlns:ma14="http://schemas.microsoft.com/office/mac/drawingml/2011/main" xmlns="" val="1"/>
+            </a:ext>
+          </a:extLst>
+        </p:spPr>
+        <p:txBody>
+          <a:bodyPr lIns="50800" tIns="50800" rIns="50800" bIns="50800" anchor="ctr"/>
+          <a:lstStyle/>
+          <a:p>
+            <a:pPr>
+              <a:defRPr sz="2400">
+                <a:solidFill>
+                  <a:srgbClr val="FFFFFF"/>
+                </a:solidFill>
+                <a:latin typeface="Helvetica Light"/>
+                <a:ea typeface="Helvetica Light"/>
+                <a:cs typeface="Helvetica Light"/>
+                <a:sym typeface="Helvetica Light"/>
+              </a:defRPr>
+            </a:pPr>
+            <a:r>
+              <a:rPr dirty="0"/>
+              <a:t>Autenticación</a:t>
+            </a:r>
+          </a:p>
+          <a:p>
+            <a:pPr>
+              <a:defRPr sz="1600">
+                <a:solidFill>
+                  <a:srgbClr val="FFFFFF"/>
+                </a:solidFill>
+                <a:latin typeface="Helvetica Light"/>
+                <a:ea typeface="Helvetica Light"/>
+                <a:cs typeface="Helvetica Light"/>
+                <a:sym typeface="Helvetica Light"/>
+              </a:defRPr>
+            </a:pPr>
+            <a:r>
+              <a:rPr dirty="0"/>
+              <a:t>(Verificación Usuario publicador)</a:t>
+            </a:r>
+          </a:p>
+        </p:txBody>
+      </p:sp>
+      <p:sp>
+        <p:nvSpPr>
+          <p:cNvPr id="190" name="Proceso de Datos…"/>
+          <p:cNvSpPr/>
+          <p:nvPr/>
+        </p:nvSpPr>
+        <p:spPr>
+          <a:xfrm>
+            <a:off x="6255782" y="5818362"/>
+            <a:ext cx="2415773" cy="1067442"/>
+          </a:xfrm>
+          <a:prstGeom prst="roundRect">
+            <a:avLst>
+              <a:gd name="adj" fmla="val 25374"/>
+            </a:avLst>
+          </a:prstGeom>
+          <a:blipFill>
+            <a:blip r:embed="rId2"/>
+          </a:blipFill>
+          <a:ln w="12700">
+            <a:miter lim="400000"/>
+          </a:ln>
+          <a:effectLst>
+            <a:outerShdw blurRad="38100" dist="25400" dir="5400000" rotWithShape="0">
+              <a:srgbClr val="000000">
+                <a:alpha val="50000"/>
+              </a:srgbClr>
+            </a:outerShdw>
+          </a:effectLst>
+          <a:extLst>
+            <a:ext uri="{C572A759-6A51-4108-AA02-DFA0A04FC94B}">
+              <ma14:wrappingTextBoxFlag xmlns:mc="http://schemas.openxmlformats.org/markup-compatibility/2006" xmlns:mv="urn:schemas-microsoft-com:mac:vml" xmlns:ma14="http://schemas.microsoft.com/office/mac/drawingml/2011/main" xmlns="" val="1"/>
+            </a:ext>
+          </a:extLst>
+        </p:spPr>
+        <p:txBody>
+          <a:bodyPr lIns="50800" tIns="50800" rIns="50800" bIns="50800" anchor="ctr"/>
+          <a:lstStyle/>
+          <a:p>
+            <a:pPr>
+              <a:defRPr sz="1600">
+                <a:solidFill>
+                  <a:srgbClr val="FFFFFF"/>
+                </a:solidFill>
+                <a:latin typeface="Helvetica Light"/>
+                <a:ea typeface="Helvetica Light"/>
+                <a:cs typeface="Helvetica Light"/>
+                <a:sym typeface="Helvetica Light"/>
+              </a:defRPr>
+            </a:pPr>
+            <a:r>
+              <a:rPr dirty="0"/>
+              <a:t>Proceso de Datos</a:t>
+            </a:r>
+          </a:p>
+          <a:p>
+            <a:pPr>
+              <a:defRPr sz="1600">
+                <a:solidFill>
+                  <a:srgbClr val="FFFFFF"/>
+                </a:solidFill>
+                <a:latin typeface="Helvetica Light"/>
+                <a:ea typeface="Helvetica Light"/>
+                <a:cs typeface="Helvetica Light"/>
+                <a:sym typeface="Helvetica Light"/>
+              </a:defRPr>
+            </a:pPr>
+            <a:r>
+              <a:rPr dirty="0"/>
+              <a:t>(Verificación Datos del vehículo)</a:t>
+            </a:r>
+          </a:p>
+        </p:txBody>
+      </p:sp>
+      <p:sp>
+        <p:nvSpPr>
+          <p:cNvPr id="191" name="Publicar Aviso…"/>
+          <p:cNvSpPr/>
+          <p:nvPr/>
+        </p:nvSpPr>
+        <p:spPr>
+          <a:xfrm>
+            <a:off x="6255782" y="7242150"/>
+            <a:ext cx="2415773" cy="1067442"/>
+          </a:xfrm>
+          <a:prstGeom prst="roundRect">
+            <a:avLst>
+              <a:gd name="adj" fmla="val 25374"/>
+            </a:avLst>
+          </a:prstGeom>
+          <a:blipFill>
+            <a:blip r:embed="rId2"/>
+          </a:blipFill>
+          <a:ln w="12700">
+            <a:miter lim="400000"/>
+          </a:ln>
+          <a:effectLst>
+            <a:outerShdw blurRad="38100" dist="25400" dir="5400000" rotWithShape="0">
+              <a:srgbClr val="000000">
+                <a:alpha val="50000"/>
+              </a:srgbClr>
+            </a:outerShdw>
+          </a:effectLst>
+          <a:extLst>
+            <a:ext uri="{C572A759-6A51-4108-AA02-DFA0A04FC94B}">
+              <ma14:wrappingTextBoxFlag xmlns:mc="http://schemas.openxmlformats.org/markup-compatibility/2006" xmlns:mv="urn:schemas-microsoft-com:mac:vml" xmlns:ma14="http://schemas.microsoft.com/office/mac/drawingml/2011/main" xmlns="" val="1"/>
+            </a:ext>
+          </a:extLst>
+        </p:spPr>
+        <p:txBody>
+          <a:bodyPr lIns="50800" tIns="50800" rIns="50800" bIns="50800" anchor="ctr"/>
+          <a:lstStyle/>
+          <a:p>
+            <a:pPr>
+              <a:defRPr sz="2200">
+                <a:solidFill>
+                  <a:srgbClr val="FFFFFF"/>
+                </a:solidFill>
+                <a:latin typeface="Helvetica Light"/>
+                <a:ea typeface="Helvetica Light"/>
+                <a:cs typeface="Helvetica Light"/>
+                <a:sym typeface="Helvetica Light"/>
+              </a:defRPr>
+            </a:pPr>
+            <a:r>
+              <a:t>Publicar Aviso</a:t>
+            </a:r>
+          </a:p>
+          <a:p>
+            <a:pPr>
+              <a:defRPr sz="1600">
+                <a:solidFill>
+                  <a:srgbClr val="FFFFFF"/>
+                </a:solidFill>
+                <a:latin typeface="Helvetica Light"/>
+                <a:ea typeface="Helvetica Light"/>
+                <a:cs typeface="Helvetica Light"/>
+                <a:sym typeface="Helvetica Light"/>
+              </a:defRPr>
+            </a:pPr>
+            <a:r>
+              <a:t>(Procesar Datos)</a:t>
+            </a:r>
+          </a:p>
+        </p:txBody>
+      </p:sp>
+      <p:sp>
+        <p:nvSpPr>
+          <p:cNvPr id="192" name="Publicación Aviso…"/>
+          <p:cNvSpPr/>
+          <p:nvPr/>
+        </p:nvSpPr>
+        <p:spPr>
+          <a:xfrm>
+            <a:off x="9953055" y="7242150"/>
+            <a:ext cx="2415773" cy="1067442"/>
+          </a:xfrm>
+          <a:prstGeom prst="roundRect">
+            <a:avLst>
+              <a:gd name="adj" fmla="val 25374"/>
+            </a:avLst>
+          </a:prstGeom>
+          <a:blipFill>
+            <a:blip r:embed="rId2"/>
+          </a:blipFill>
+          <a:ln w="12700">
+            <a:miter lim="400000"/>
+          </a:ln>
+          <a:effectLst>
+            <a:outerShdw blurRad="38100" dist="25400" dir="5400000" rotWithShape="0">
+              <a:srgbClr val="000000">
+                <a:alpha val="50000"/>
+              </a:srgbClr>
+            </a:outerShdw>
+          </a:effectLst>
+          <a:extLst>
+            <a:ext uri="{C572A759-6A51-4108-AA02-DFA0A04FC94B}">
+              <ma14:wrappingTextBoxFlag xmlns:mc="http://schemas.openxmlformats.org/markup-compatibility/2006" xmlns:mv="urn:schemas-microsoft-com:mac:vml" xmlns:ma14="http://schemas.microsoft.com/office/mac/drawingml/2011/main" xmlns="" val="1"/>
+            </a:ext>
+          </a:extLst>
+        </p:spPr>
+        <p:txBody>
+          <a:bodyPr lIns="50800" tIns="50800" rIns="50800" bIns="50800" anchor="ctr"/>
+          <a:lstStyle/>
+          <a:p>
+            <a:pPr>
+              <a:defRPr sz="2200">
+                <a:solidFill>
+                  <a:srgbClr val="FFFFFF"/>
+                </a:solidFill>
+                <a:latin typeface="Helvetica Light"/>
+                <a:ea typeface="Helvetica Light"/>
+                <a:cs typeface="Helvetica Light"/>
+                <a:sym typeface="Helvetica Light"/>
+              </a:defRPr>
+            </a:pPr>
+            <a:r>
+              <a:rPr sz="1600" dirty="0" err="1" smtClean="0"/>
+              <a:t>Publicación</a:t>
+            </a:r>
+            <a:r>
+              <a:rPr lang="es-ES" sz="1600" dirty="0" smtClean="0"/>
+              <a:t> / Modificación</a:t>
+            </a:r>
+            <a:endParaRPr sz="1600" dirty="0"/>
+          </a:p>
+          <a:p>
+            <a:pPr>
+              <a:defRPr sz="1600">
+                <a:solidFill>
+                  <a:srgbClr val="FFFFFF"/>
+                </a:solidFill>
+                <a:latin typeface="Helvetica Light"/>
+                <a:ea typeface="Helvetica Light"/>
+                <a:cs typeface="Helvetica Light"/>
+                <a:sym typeface="Helvetica Light"/>
+              </a:defRPr>
+            </a:pPr>
+            <a:r>
+              <a:rPr dirty="0"/>
+              <a:t>(</a:t>
+            </a:r>
+            <a:r>
+              <a:rPr dirty="0" err="1"/>
+              <a:t>Publicación</a:t>
+            </a:r>
+            <a:r>
+              <a:rPr dirty="0"/>
+              <a:t> </a:t>
+            </a:r>
+            <a:r>
+              <a:rPr lang="es-ES" dirty="0" smtClean="0"/>
+              <a:t>Aviso </a:t>
+            </a:r>
+            <a:r>
+              <a:rPr dirty="0" err="1" smtClean="0"/>
+              <a:t>en</a:t>
+            </a:r>
+            <a:r>
+              <a:rPr dirty="0" smtClean="0"/>
+              <a:t> </a:t>
+            </a:r>
+            <a:r>
+              <a:rPr dirty="0"/>
+              <a:t>Web)</a:t>
+            </a:r>
+          </a:p>
+        </p:txBody>
+      </p:sp>
+      <p:sp>
+        <p:nvSpPr>
+          <p:cNvPr id="193" name="Procesar Imagen…"/>
+          <p:cNvSpPr/>
+          <p:nvPr/>
+        </p:nvSpPr>
+        <p:spPr>
+          <a:xfrm>
+            <a:off x="9940355" y="5645708"/>
+            <a:ext cx="2415773" cy="1431522"/>
+          </a:xfrm>
+          <a:prstGeom prst="roundRect">
+            <a:avLst>
+              <a:gd name="adj" fmla="val 18920"/>
+            </a:avLst>
+          </a:prstGeom>
+          <a:blipFill>
+            <a:blip r:embed="rId2"/>
+          </a:blipFill>
+          <a:ln w="12700">
+            <a:miter lim="400000"/>
+          </a:ln>
+          <a:effectLst>
+            <a:outerShdw blurRad="38100" dist="25400" dir="5400000" rotWithShape="0">
+              <a:srgbClr val="000000">
+                <a:alpha val="50000"/>
+              </a:srgbClr>
+            </a:outerShdw>
+          </a:effectLst>
+          <a:extLst>
+            <a:ext uri="{C572A759-6A51-4108-AA02-DFA0A04FC94B}">
+              <ma14:wrappingTextBoxFlag xmlns:mc="http://schemas.openxmlformats.org/markup-compatibility/2006" xmlns:mv="urn:schemas-microsoft-com:mac:vml" xmlns:ma14="http://schemas.microsoft.com/office/mac/drawingml/2011/main" xmlns="" val="1"/>
+            </a:ext>
+          </a:extLst>
+        </p:spPr>
+        <p:txBody>
+          <a:bodyPr lIns="50800" tIns="50800" rIns="50800" bIns="50800" anchor="ctr"/>
+          <a:lstStyle/>
+          <a:p>
+            <a:pPr>
+              <a:defRPr sz="2200">
+                <a:solidFill>
+                  <a:srgbClr val="FFFFFF"/>
+                </a:solidFill>
+                <a:latin typeface="Helvetica Light"/>
+                <a:ea typeface="Helvetica Light"/>
+                <a:cs typeface="Helvetica Light"/>
+                <a:sym typeface="Helvetica Light"/>
+              </a:defRPr>
+            </a:pPr>
+            <a:r>
+              <a:t>Procesar Imagen</a:t>
+            </a:r>
+            <a:endParaRPr sz="1200"/>
+          </a:p>
+          <a:p>
+            <a:pPr>
+              <a:defRPr sz="1400">
+                <a:solidFill>
+                  <a:srgbClr val="FFFFFF"/>
+                </a:solidFill>
+                <a:latin typeface="Helvetica Light"/>
+                <a:ea typeface="Helvetica Light"/>
+                <a:cs typeface="Helvetica Light"/>
+                <a:sym typeface="Helvetica Light"/>
+              </a:defRPr>
+            </a:pPr>
+            <a:r>
+              <a:t>(Carga de imágenes en Servidor)</a:t>
+            </a:r>
+          </a:p>
+        </p:txBody>
+      </p:sp>
+      <p:cxnSp>
+        <p:nvCxnSpPr>
+          <p:cNvPr id="194" name="Linea di collegamento"/>
+          <p:cNvCxnSpPr>
+            <a:stCxn id="189" idx="0"/>
+            <a:endCxn id="188" idx="2"/>
+          </p:cNvCxnSpPr>
+          <p:nvPr/>
+        </p:nvCxnSpPr>
+        <p:spPr>
+          <a:xfrm flipH="1" flipV="1">
+            <a:off x="7443666" y="4000027"/>
+            <a:ext cx="20003" cy="394548"/>
+          </a:xfrm>
+          <a:prstGeom prst="straightConnector1">
+            <a:avLst/>
+          </a:prstGeom>
+          <a:ln w="50800">
+            <a:solidFill>
+              <a:srgbClr val="F39018"/>
+            </a:solidFill>
+            <a:miter lim="400000"/>
+            <a:headEnd type="arrow"/>
+          </a:ln>
+        </p:spPr>
+      </p:cxnSp>
+      <p:cxnSp>
+        <p:nvCxnSpPr>
+          <p:cNvPr id="195" name="Linea di collegamento"/>
+          <p:cNvCxnSpPr>
+            <a:stCxn id="190" idx="0"/>
+            <a:endCxn id="189" idx="2"/>
+          </p:cNvCxnSpPr>
+          <p:nvPr/>
+        </p:nvCxnSpPr>
+        <p:spPr>
+          <a:xfrm flipV="1">
+            <a:off x="7463669" y="5462017"/>
+            <a:ext cx="0" cy="356345"/>
+          </a:xfrm>
+          <a:prstGeom prst="straightConnector1">
+            <a:avLst/>
+          </a:prstGeom>
+          <a:ln w="50800">
+            <a:solidFill>
+              <a:srgbClr val="F39018"/>
+            </a:solidFill>
+            <a:miter lim="400000"/>
+            <a:headEnd type="arrow"/>
+          </a:ln>
+        </p:spPr>
+      </p:cxnSp>
+      <p:cxnSp>
+        <p:nvCxnSpPr>
+          <p:cNvPr id="196" name="Linea di collegamento"/>
+          <p:cNvCxnSpPr>
+            <a:stCxn id="191" idx="0"/>
+            <a:endCxn id="190" idx="2"/>
+          </p:cNvCxnSpPr>
+          <p:nvPr/>
+        </p:nvCxnSpPr>
+        <p:spPr>
+          <a:xfrm flipV="1">
+            <a:off x="7463669" y="6885804"/>
+            <a:ext cx="0" cy="356346"/>
+          </a:xfrm>
+          <a:prstGeom prst="straightConnector1">
+            <a:avLst/>
+          </a:prstGeom>
+          <a:ln w="50800">
+            <a:solidFill>
+              <a:srgbClr val="F39018"/>
+            </a:solidFill>
+            <a:miter lim="400000"/>
+            <a:headEnd type="arrow"/>
+          </a:ln>
+        </p:spPr>
+      </p:cxnSp>
+      <p:sp>
+        <p:nvSpPr>
+          <p:cNvPr id="197" name="Linea"/>
+          <p:cNvSpPr/>
+          <p:nvPr/>
+        </p:nvSpPr>
+        <p:spPr>
+          <a:xfrm flipV="1">
+            <a:off x="8671556" y="6356961"/>
+            <a:ext cx="1281500" cy="1427567"/>
+          </a:xfrm>
+          <a:prstGeom prst="line">
+            <a:avLst/>
+          </a:prstGeom>
+          <a:ln w="50800">
+            <a:solidFill>
+              <a:srgbClr val="F39018"/>
+            </a:solidFill>
+            <a:miter lim="400000"/>
+            <a:tailEnd type="arrow"/>
+          </a:ln>
+        </p:spPr>
+        <p:txBody>
+          <a:bodyPr lIns="50800" tIns="50800" rIns="50800" bIns="50800" anchor="ctr"/>
+          <a:lstStyle/>
+          <a:p>
+            <a:pPr>
+              <a:defRPr sz="3000">
+                <a:solidFill>
+                  <a:srgbClr val="737373"/>
+                </a:solidFill>
+                <a:latin typeface="Helvetica Neue"/>
+                <a:ea typeface="Helvetica Neue"/>
+                <a:cs typeface="Helvetica Neue"/>
+                <a:sym typeface="Helvetica Neue"/>
+              </a:defRPr>
+            </a:pPr>
+            <a:endParaRPr/>
+          </a:p>
+        </p:txBody>
+      </p:sp>
+      <p:sp>
+        <p:nvSpPr>
+          <p:cNvPr id="199" name="Linea"/>
+          <p:cNvSpPr/>
+          <p:nvPr/>
+        </p:nvSpPr>
+        <p:spPr>
+          <a:xfrm>
+            <a:off x="8671555" y="7871036"/>
+            <a:ext cx="1281500" cy="3781"/>
+          </a:xfrm>
+          <a:prstGeom prst="line">
+            <a:avLst/>
+          </a:prstGeom>
+          <a:ln w="50800">
+            <a:solidFill>
+              <a:srgbClr val="F39018"/>
+            </a:solidFill>
+            <a:miter lim="400000"/>
+            <a:tailEnd type="arrow"/>
+          </a:ln>
+        </p:spPr>
+        <p:txBody>
+          <a:bodyPr lIns="50800" tIns="50800" rIns="50800" bIns="50800" anchor="ctr"/>
+          <a:lstStyle/>
+          <a:p>
+            <a:pPr>
+              <a:defRPr sz="3000">
+                <a:solidFill>
+                  <a:srgbClr val="737373"/>
+                </a:solidFill>
+                <a:latin typeface="Helvetica Neue"/>
+                <a:ea typeface="Helvetica Neue"/>
+                <a:cs typeface="Helvetica Neue"/>
+                <a:sym typeface="Helvetica Neue"/>
+              </a:defRPr>
+            </a:pPr>
+            <a:endParaRPr/>
+          </a:p>
+        </p:txBody>
+      </p:sp>
+      <p:sp>
+        <p:nvSpPr>
+          <p:cNvPr id="200" name="Registro Archivo…"/>
+          <p:cNvSpPr/>
+          <p:nvPr/>
+        </p:nvSpPr>
+        <p:spPr>
+          <a:xfrm>
+            <a:off x="9924285" y="4304287"/>
+            <a:ext cx="2415773" cy="1067442"/>
+          </a:xfrm>
+          <a:prstGeom prst="roundRect">
+            <a:avLst>
+              <a:gd name="adj" fmla="val 25374"/>
+            </a:avLst>
+          </a:prstGeom>
+          <a:blipFill>
+            <a:blip r:embed="rId2"/>
+          </a:blipFill>
+          <a:ln w="12700">
+            <a:miter lim="400000"/>
+          </a:ln>
+          <a:effectLst>
+            <a:outerShdw blurRad="38100" dist="25400" dir="5400000" rotWithShape="0">
+              <a:srgbClr val="000000">
+                <a:alpha val="50000"/>
+              </a:srgbClr>
+            </a:outerShdw>
+          </a:effectLst>
+          <a:extLst>
+            <a:ext uri="{C572A759-6A51-4108-AA02-DFA0A04FC94B}">
+              <ma14:wrappingTextBoxFlag xmlns:mc="http://schemas.openxmlformats.org/markup-compatibility/2006" xmlns:mv="urn:schemas-microsoft-com:mac:vml" xmlns:ma14="http://schemas.microsoft.com/office/mac/drawingml/2011/main" xmlns="" val="1"/>
+            </a:ext>
+          </a:extLst>
+        </p:spPr>
+        <p:txBody>
+          <a:bodyPr lIns="50800" tIns="50800" rIns="50800" bIns="50800" anchor="ctr"/>
+          <a:lstStyle/>
+          <a:p>
+            <a:pPr>
+              <a:defRPr sz="2200">
+                <a:solidFill>
+                  <a:srgbClr val="FFFFFF"/>
+                </a:solidFill>
+                <a:latin typeface="Helvetica Light"/>
+                <a:ea typeface="Helvetica Light"/>
+                <a:cs typeface="Helvetica Light"/>
+                <a:sym typeface="Helvetica Light"/>
+              </a:defRPr>
+            </a:pPr>
+            <a:r>
+              <a:t>Registro Archivo</a:t>
+            </a:r>
+          </a:p>
+          <a:p>
+            <a:pPr>
+              <a:defRPr sz="1600">
+                <a:solidFill>
+                  <a:srgbClr val="FFFFFF"/>
+                </a:solidFill>
+                <a:latin typeface="Helvetica Light"/>
+                <a:ea typeface="Helvetica Light"/>
+                <a:cs typeface="Helvetica Light"/>
+                <a:sym typeface="Helvetica Light"/>
+              </a:defRPr>
+            </a:pPr>
+            <a:r>
+              <a:t>(Control de Procesos)</a:t>
+            </a:r>
+          </a:p>
+        </p:txBody>
+      </p:sp>
+      <p:sp>
+        <p:nvSpPr>
+          <p:cNvPr id="201" name="Linea"/>
+          <p:cNvSpPr/>
+          <p:nvPr/>
+        </p:nvSpPr>
+        <p:spPr>
+          <a:xfrm>
+            <a:off x="8671555" y="4843864"/>
+            <a:ext cx="1181506" cy="0"/>
+          </a:xfrm>
+          <a:prstGeom prst="line">
+            <a:avLst/>
+          </a:prstGeom>
+          <a:ln w="50800">
+            <a:solidFill>
+              <a:srgbClr val="F39018"/>
+            </a:solidFill>
+            <a:miter lim="400000"/>
+            <a:tailEnd type="arrow"/>
+          </a:ln>
+        </p:spPr>
+        <p:txBody>
+          <a:bodyPr lIns="50800" tIns="50800" rIns="50800" bIns="50800" anchor="ctr"/>
+          <a:lstStyle/>
+          <a:p>
+            <a:pPr>
+              <a:defRPr sz="3000">
+                <a:solidFill>
+                  <a:srgbClr val="737373"/>
+                </a:solidFill>
+                <a:latin typeface="Helvetica Neue"/>
+                <a:ea typeface="Helvetica Neue"/>
+                <a:cs typeface="Helvetica Neue"/>
+                <a:sym typeface="Helvetica Neue"/>
+              </a:defRPr>
+            </a:pPr>
+            <a:endParaRPr/>
+          </a:p>
+        </p:txBody>
+      </p:sp>
+      <p:sp>
+        <p:nvSpPr>
+          <p:cNvPr id="18" name="Servicio Publicación…"/>
+          <p:cNvSpPr/>
+          <p:nvPr/>
+        </p:nvSpPr>
+        <p:spPr>
+          <a:xfrm>
+            <a:off x="604819" y="2710388"/>
+            <a:ext cx="1839516" cy="5899286"/>
+          </a:xfrm>
+          <a:prstGeom prst="roundRect">
+            <a:avLst>
+              <a:gd name="adj" fmla="val 10356"/>
+            </a:avLst>
+          </a:prstGeom>
+          <a:blipFill>
+            <a:blip r:embed="rId3"/>
+          </a:blipFill>
+          <a:ln w="12700">
+            <a:miter lim="400000"/>
+          </a:ln>
+          <a:effectLst>
+            <a:outerShdw blurRad="38100" dist="25400" dir="5400000" rotWithShape="0">
+              <a:srgbClr val="000000">
+                <a:alpha val="50000"/>
+              </a:srgbClr>
+            </a:outerShdw>
+          </a:effectLst>
+          <a:extLst>
+            <a:ext uri="{C572A759-6A51-4108-AA02-DFA0A04FC94B}">
+              <ma14:wrappingTextBoxFlag xmlns:mc="http://schemas.openxmlformats.org/markup-compatibility/2006" xmlns:mv="urn:schemas-microsoft-com:mac:vml" xmlns:ma14="http://schemas.microsoft.com/office/mac/drawingml/2011/main" xmlns="" val="1"/>
+            </a:ext>
+          </a:extLst>
+        </p:spPr>
+        <p:txBody>
+          <a:bodyPr lIns="50800" tIns="50800" rIns="50800" bIns="50800" anchor="ctr"/>
+          <a:lstStyle/>
+          <a:p>
+            <a:pPr>
+              <a:defRPr sz="2400">
+                <a:solidFill>
+                  <a:srgbClr val="FFFFFF"/>
+                </a:solidFill>
+                <a:latin typeface="Helvetica Light"/>
+                <a:ea typeface="Helvetica Light"/>
+                <a:cs typeface="Helvetica Light"/>
+                <a:sym typeface="Helvetica Light"/>
+              </a:defRPr>
+            </a:pPr>
+            <a:r>
+              <a:rPr dirty="0" err="1"/>
+              <a:t>Servicio</a:t>
+            </a:r>
+            <a:r>
+              <a:rPr dirty="0"/>
+              <a:t> </a:t>
+            </a:r>
+            <a:r>
+              <a:rPr dirty="0" err="1"/>
+              <a:t>Publicación</a:t>
+            </a:r>
+            <a:endParaRPr dirty="0"/>
+          </a:p>
+          <a:p>
+            <a:pPr>
+              <a:defRPr sz="1600">
+                <a:solidFill>
+                  <a:srgbClr val="FFFFFF"/>
+                </a:solidFill>
+                <a:latin typeface="Helvetica Light"/>
+                <a:ea typeface="Helvetica Light"/>
+                <a:cs typeface="Helvetica Light"/>
+                <a:sym typeface="Helvetica Light"/>
+              </a:defRPr>
+            </a:pPr>
+            <a:r>
+              <a:rPr sz="1200" dirty="0"/>
+              <a:t>(ASP.NET)</a:t>
+            </a:r>
+          </a:p>
+        </p:txBody>
+      </p:sp>
+      <p:sp>
+        <p:nvSpPr>
+          <p:cNvPr id="19" name="Linea"/>
+          <p:cNvSpPr/>
+          <p:nvPr/>
+        </p:nvSpPr>
+        <p:spPr>
+          <a:xfrm>
+            <a:off x="5422280" y="3436640"/>
+            <a:ext cx="833502" cy="0"/>
+          </a:xfrm>
+          <a:prstGeom prst="line">
+            <a:avLst/>
+          </a:prstGeom>
+          <a:ln w="50800">
+            <a:solidFill>
+              <a:srgbClr val="F39018"/>
+            </a:solidFill>
+            <a:miter lim="400000"/>
+            <a:tailEnd type="arrow"/>
+          </a:ln>
+        </p:spPr>
+        <p:txBody>
+          <a:bodyPr lIns="50800" tIns="50800" rIns="50800" bIns="50800" anchor="ctr"/>
+          <a:lstStyle/>
+          <a:p>
+            <a:pPr>
+              <a:defRPr sz="3000">
+                <a:solidFill>
+                  <a:srgbClr val="737373"/>
+                </a:solidFill>
+                <a:latin typeface="Helvetica Neue"/>
+                <a:ea typeface="Helvetica Neue"/>
+                <a:cs typeface="Helvetica Neue"/>
+                <a:sym typeface="Helvetica Neue"/>
+              </a:defRPr>
+            </a:pPr>
+            <a:endParaRPr/>
+          </a:p>
+        </p:txBody>
+      </p:sp>
+      <p:sp>
+        <p:nvSpPr>
+          <p:cNvPr id="20" name="Linea"/>
+          <p:cNvSpPr/>
+          <p:nvPr/>
+        </p:nvSpPr>
+        <p:spPr>
+          <a:xfrm>
+            <a:off x="2444334" y="5645708"/>
+            <a:ext cx="813499" cy="15805"/>
+          </a:xfrm>
+          <a:prstGeom prst="line">
+            <a:avLst/>
+          </a:prstGeom>
+          <a:ln w="50800">
+            <a:solidFill>
+              <a:srgbClr val="F39018"/>
+            </a:solidFill>
+            <a:miter lim="400000"/>
+            <a:tailEnd type="arrow"/>
+          </a:ln>
+        </p:spPr>
+        <p:txBody>
+          <a:bodyPr lIns="50800" tIns="50800" rIns="50800" bIns="50800" anchor="ctr"/>
+          <a:lstStyle/>
+          <a:p>
+            <a:pPr>
+              <a:defRPr sz="3000">
+                <a:solidFill>
+                  <a:srgbClr val="737373"/>
+                </a:solidFill>
+                <a:latin typeface="Helvetica Neue"/>
+                <a:ea typeface="Helvetica Neue"/>
+                <a:cs typeface="Helvetica Neue"/>
+                <a:sym typeface="Helvetica Neue"/>
+              </a:defRPr>
+            </a:pPr>
+            <a:endParaRPr/>
+          </a:p>
+        </p:txBody>
+      </p:sp>
+    </p:spTree>
+    <p:extLst>
+      <p:ext uri="{BB962C8B-B14F-4D97-AF65-F5344CB8AC3E}">
+        <p14:creationId xmlns:p14="http://schemas.microsoft.com/office/powerpoint/2010/main" val="1341996186"/>
+      </p:ext>
+    </p:extLst>
   </p:cSld>
   <p:clrMapOvr>
     <a:masterClrMapping/>

</xml_diff>